<commit_message>
latests version of the presentation
</commit_message>
<xml_diff>
--- a/data/presentation/PS_presentation.pptx
+++ b/data/presentation/PS_presentation.pptx
@@ -118,6 +118,9 @@
   <p:extLst>
     <p:ext uri="{EFAFB233-063F-42B5-8137-9DF3F51BA10A}">
       <p15:sldGuideLst xmlns:p15="http://schemas.microsoft.com/office/powerpoint/2012/main"/>
+    </p:ext>
+    <p:ext uri="{2D200454-40CA-4A62-9FC3-DE9A4176ACB9}">
+      <p15:notesGuideLst xmlns:p15="http://schemas.microsoft.com/office/powerpoint/2012/main"/>
     </p:ext>
   </p:extLst>
 </p:presentation>
@@ -1250,14 +1253,14 @@
       </dgm:t>
     </dgm:pt>
     <dgm:pt modelId="{DDBEC27C-3A33-4C94-BCCF-51589B63D2AF}">
-      <dgm:prSet phldrT="[Text]"/>
+      <dgm:prSet phldrT="[Text]" custT="1"/>
       <dgm:spPr/>
       <dgm:t>
         <a:bodyPr/>
         <a:lstStyle/>
         <a:p>
           <a:r>
-            <a:rPr lang="en-GB" dirty="0"/>
+            <a:rPr lang="en-GB" sz="2000" dirty="0"/>
             <a:t>Performance</a:t>
           </a:r>
         </a:p>
@@ -1466,14 +1469,14 @@
       </dgm:t>
     </dgm:pt>
     <dgm:pt modelId="{900DA08A-CB03-49A3-A51F-560CB31758AE}">
-      <dgm:prSet phldrT="[Text]"/>
+      <dgm:prSet phldrT="[Text]" custT="1"/>
       <dgm:spPr/>
       <dgm:t>
         <a:bodyPr/>
         <a:lstStyle/>
         <a:p>
           <a:r>
-            <a:rPr lang="en-GB" dirty="0"/>
+            <a:rPr lang="en-GB" sz="2000" dirty="0"/>
             <a:t>Robustness</a:t>
           </a:r>
         </a:p>
@@ -1498,6 +1501,42 @@
         <a:lstStyle/>
         <a:p>
           <a:endParaRPr lang="en-GB"/>
+        </a:p>
+      </dgm:t>
+    </dgm:pt>
+    <dgm:pt modelId="{90476383-FCAD-49A9-A8C2-5FCA3FABFAD2}">
+      <dgm:prSet phldrT="[Text]"/>
+      <dgm:spPr/>
+      <dgm:t>
+        <a:bodyPr/>
+        <a:lstStyle/>
+        <a:p>
+          <a:r>
+            <a:rPr lang="en-GB" dirty="0"/>
+            <a:t>Easy access by a struct</a:t>
+          </a:r>
+        </a:p>
+      </dgm:t>
+    </dgm:pt>
+    <dgm:pt modelId="{17CB4363-828D-4B3E-93EF-D9D991BF5349}" type="parTrans" cxnId="{D399E4BA-4459-4435-B2D5-93AB53B7473D}">
+      <dgm:prSet/>
+      <dgm:spPr/>
+      <dgm:t>
+        <a:bodyPr/>
+        <a:lstStyle/>
+        <a:p>
+          <a:endParaRPr lang="de-DE"/>
+        </a:p>
+      </dgm:t>
+    </dgm:pt>
+    <dgm:pt modelId="{28922084-9DC7-4C41-81C3-B06C468E9F2A}" type="sibTrans" cxnId="{D399E4BA-4459-4435-B2D5-93AB53B7473D}">
+      <dgm:prSet/>
+      <dgm:spPr/>
+      <dgm:t>
+        <a:bodyPr/>
+        <a:lstStyle/>
+        <a:p>
+          <a:endParaRPr lang="de-DE"/>
         </a:p>
       </dgm:t>
     </dgm:pt>
@@ -1618,7 +1657,7 @@
     <dgm:cxn modelId="{92F5F606-8B69-431F-A74E-F88AF8529E40}" type="presOf" srcId="{DB28B0CC-0545-4664-9DB1-DF5F57C2885B}" destId="{AB3F3ED0-C353-4106-AE9F-58BADC57B5A3}" srcOrd="0" destOrd="2" presId="urn:microsoft.com/office/officeart/2005/8/layout/hList1"/>
     <dgm:cxn modelId="{54C0C30E-F177-4159-A831-EC8F5CA2C483}" srcId="{25B20CE3-F2BA-4B66-8727-7C1AD8C6CC89}" destId="{D78BEAA3-1769-40AF-BB21-1FEDE668C53D}" srcOrd="3" destOrd="0" parTransId="{B59CD722-B21F-40DA-B29F-16010C0B90D8}" sibTransId="{B298F9B3-89E4-4591-A05F-DDB23112CC09}"/>
     <dgm:cxn modelId="{504C1D22-6F1E-43EB-B00F-58A0DB036B63}" type="presOf" srcId="{95EE15FC-DA97-491E-AE7F-E3D2B7EA693C}" destId="{AB3F3ED0-C353-4106-AE9F-58BADC57B5A3}" srcOrd="0" destOrd="4" presId="urn:microsoft.com/office/officeart/2005/8/layout/hList1"/>
-    <dgm:cxn modelId="{FA4CD924-E3FE-4CFB-840C-634FBE4DCED8}" srcId="{19A4407C-924F-4918-A9FF-12011F4CEA9B}" destId="{CDB271D0-6E9C-4853-BEBF-8C0C58ED76B3}" srcOrd="2" destOrd="0" parTransId="{27973728-C45A-4C7B-892A-7D75D8BD9E14}" sibTransId="{C1B4149F-5318-4D31-9BA7-C2EB5138B223}"/>
+    <dgm:cxn modelId="{FA4CD924-E3FE-4CFB-840C-634FBE4DCED8}" srcId="{19A4407C-924F-4918-A9FF-12011F4CEA9B}" destId="{CDB271D0-6E9C-4853-BEBF-8C0C58ED76B3}" srcOrd="3" destOrd="0" parTransId="{27973728-C45A-4C7B-892A-7D75D8BD9E14}" sibTransId="{C1B4149F-5318-4D31-9BA7-C2EB5138B223}"/>
     <dgm:cxn modelId="{0670C235-F332-46FE-A5A6-5D53134420AE}" type="presOf" srcId="{1B3D78F2-D344-49FA-AD5F-204135470CA8}" destId="{AB3F3ED0-C353-4106-AE9F-58BADC57B5A3}" srcOrd="0" destOrd="0" presId="urn:microsoft.com/office/officeart/2005/8/layout/hList1"/>
     <dgm:cxn modelId="{E3ED8C36-8848-43DC-8C0C-AD11BF6ABA3E}" type="presOf" srcId="{51CD9286-5F51-443B-B9DC-7862A0B12C37}" destId="{071927AB-A6EC-4C09-931D-02BE466E7B3F}" srcOrd="0" destOrd="1" presId="urn:microsoft.com/office/officeart/2005/8/layout/hList1"/>
     <dgm:cxn modelId="{85A5A836-DFEE-4A31-AE75-7913054C7464}" srcId="{25B20CE3-F2BA-4B66-8727-7C1AD8C6CC89}" destId="{58833EB1-48C3-44FE-839D-3712D350D848}" srcOrd="1" destOrd="0" parTransId="{1B9E803A-827C-4642-A48F-7AFB8610B5C5}" sibTransId="{43E2ECC0-A17E-4DA3-9BE9-E5797E83C1C3}"/>
@@ -1632,14 +1671,16 @@
     <dgm:cxn modelId="{69D9CD58-8573-4AD5-911D-19D2CC0389DE}" srcId="{19A4407C-924F-4918-A9FF-12011F4CEA9B}" destId="{367259CD-3583-4C6D-8E0A-46093B187AEB}" srcOrd="0" destOrd="0" parTransId="{B75DB198-3B90-4A98-A3BA-38C178332DD7}" sibTransId="{C6623FFE-EA17-4BF5-A819-B525C5C09E98}"/>
     <dgm:cxn modelId="{0FF09759-E691-499C-81DA-7A53AC68B6D9}" type="presOf" srcId="{3380A10D-84CC-408C-9017-5D39B8D8C920}" destId="{195B9F5F-DC90-4DDE-A008-D743D5E18D83}" srcOrd="0" destOrd="0" presId="urn:microsoft.com/office/officeart/2005/8/layout/hList1"/>
     <dgm:cxn modelId="{170BEC59-61D6-4755-B7FE-CD925DE27719}" type="presOf" srcId="{20AE3CD3-9581-4BAD-BAF3-4EB02E8FA467}" destId="{071927AB-A6EC-4C09-931D-02BE466E7B3F}" srcOrd="0" destOrd="0" presId="urn:microsoft.com/office/officeart/2005/8/layout/hList1"/>
+    <dgm:cxn modelId="{9283C27F-BB9A-4D4B-A326-E05A119FDD08}" type="presOf" srcId="{90476383-FCAD-49A9-A8C2-5FCA3FABFAD2}" destId="{F1738DBC-2D18-47D2-97EF-7B3AB1B94588}" srcOrd="0" destOrd="2" presId="urn:microsoft.com/office/officeart/2005/8/layout/hList1"/>
     <dgm:cxn modelId="{21C21081-CB9F-4F3B-A4B8-9D1F6B3F9961}" srcId="{25B20CE3-F2BA-4B66-8727-7C1AD8C6CC89}" destId="{1B3D78F2-D344-49FA-AD5F-204135470CA8}" srcOrd="0" destOrd="0" parTransId="{761BFC96-8461-41DB-810D-638524723C5C}" sibTransId="{BF3FF03A-4910-4EC8-89F2-70CF5A5B9CE8}"/>
     <dgm:cxn modelId="{DAC39E88-5DA7-4A05-A871-6FF16C05D23E}" type="presOf" srcId="{22DB3E3D-CB24-4FE3-ACD5-B36A55FAE080}" destId="{AB3F3ED0-C353-4106-AE9F-58BADC57B5A3}" srcOrd="0" destOrd="1" presId="urn:microsoft.com/office/officeart/2005/8/layout/hList1"/>
     <dgm:cxn modelId="{9F06EA8E-54A3-442E-ACB9-1BE166D05200}" srcId="{FE2D95C6-68AA-414F-9718-ED6C7C224D4A}" destId="{20AE3CD3-9581-4BAD-BAF3-4EB02E8FA467}" srcOrd="0" destOrd="0" parTransId="{CFD50D0D-8D20-4766-A970-253FA1E473EF}" sibTransId="{C9342DA7-9594-4CF3-876E-D093BDEFD202}"/>
     <dgm:cxn modelId="{4E313295-B0CC-4093-A9E7-37F14EDDADA2}" type="presOf" srcId="{FE2D95C6-68AA-414F-9718-ED6C7C224D4A}" destId="{FCFA5902-CDA4-44D7-81F4-7642CD4645E5}" srcOrd="0" destOrd="0" presId="urn:microsoft.com/office/officeart/2005/8/layout/hList1"/>
     <dgm:cxn modelId="{219C2599-CBDE-4D8A-B8A3-D8CA8A3CF351}" srcId="{3380A10D-84CC-408C-9017-5D39B8D8C920}" destId="{900DA08A-CB03-49A3-A51F-560CB31758AE}" srcOrd="1" destOrd="0" parTransId="{07D0AA38-18C7-4360-8B95-69F6578CEB18}" sibTransId="{A8FCCD37-FDA8-4152-B9CC-9C3A58939BDA}"/>
     <dgm:cxn modelId="{7EDD64B9-A0D2-445F-88B2-9A34FAC7208B}" srcId="{FCC8923D-1C02-4F0A-BA97-113C006F84F3}" destId="{19A4407C-924F-4918-A9FF-12011F4CEA9B}" srcOrd="2" destOrd="0" parTransId="{9E2DFBE2-FF0F-4F86-B67D-D6E14A8D35B5}" sibTransId="{47CFE9ED-B482-4493-864F-59AE7A543522}"/>
+    <dgm:cxn modelId="{D399E4BA-4459-4435-B2D5-93AB53B7473D}" srcId="{19A4407C-924F-4918-A9FF-12011F4CEA9B}" destId="{90476383-FCAD-49A9-A8C2-5FCA3FABFAD2}" srcOrd="2" destOrd="0" parTransId="{17CB4363-828D-4B3E-93EF-D9D991BF5349}" sibTransId="{28922084-9DC7-4C41-81C3-B06C468E9F2A}"/>
     <dgm:cxn modelId="{15ED37BB-B3BE-46D6-80E7-C1C42C2D8715}" type="presOf" srcId="{19A4407C-924F-4918-A9FF-12011F4CEA9B}" destId="{270C6582-85ED-4E53-9018-63CDC739E4FE}" srcOrd="0" destOrd="0" presId="urn:microsoft.com/office/officeart/2005/8/layout/hList1"/>
-    <dgm:cxn modelId="{891C0DC9-229B-4D4B-A388-042DC5C416D2}" type="presOf" srcId="{CDB271D0-6E9C-4853-BEBF-8C0C58ED76B3}" destId="{F1738DBC-2D18-47D2-97EF-7B3AB1B94588}" srcOrd="0" destOrd="2" presId="urn:microsoft.com/office/officeart/2005/8/layout/hList1"/>
+    <dgm:cxn modelId="{891C0DC9-229B-4D4B-A388-042DC5C416D2}" type="presOf" srcId="{CDB271D0-6E9C-4853-BEBF-8C0C58ED76B3}" destId="{F1738DBC-2D18-47D2-97EF-7B3AB1B94588}" srcOrd="0" destOrd="3" presId="urn:microsoft.com/office/officeart/2005/8/layout/hList1"/>
     <dgm:cxn modelId="{FE009DCA-024D-4DA0-9320-A795D416E7E0}" srcId="{3380A10D-84CC-408C-9017-5D39B8D8C920}" destId="{DDBEC27C-3A33-4C94-BCCF-51589B63D2AF}" srcOrd="0" destOrd="0" parTransId="{A14B49BE-7643-4DCD-AD45-3563E5AC3BF7}" sibTransId="{AABB19A2-C92F-42E8-8712-302C7F729B5B}"/>
     <dgm:cxn modelId="{E08687D1-2C0C-477C-A924-A9F7D1799115}" srcId="{FE2D95C6-68AA-414F-9718-ED6C7C224D4A}" destId="{51CD9286-5F51-443B-B9DC-7862A0B12C37}" srcOrd="1" destOrd="0" parTransId="{87D17C0F-5FC3-4D87-AA4F-2CAB601B6EAF}" sibTransId="{78222FC3-EE74-47A7-B42F-8F2691729E9B}"/>
     <dgm:cxn modelId="{B59477E4-71D4-47A3-A50B-54D2ED0D721D}" type="presOf" srcId="{FCC8923D-1C02-4F0A-BA97-113C006F84F3}" destId="{A9A4DDB9-E64E-4F0E-B2BD-F8419AC57381}" srcOrd="0" destOrd="0" presId="urn:microsoft.com/office/officeart/2005/8/layout/hList1"/>
@@ -1692,7 +1733,7 @@
       </dsp:nvSpPr>
       <dsp:spPr>
         <a:xfrm>
-          <a:off x="3248" y="1162436"/>
+          <a:off x="3248" y="1099730"/>
           <a:ext cx="1953094" cy="589850"/>
         </a:xfrm>
         <a:prstGeom prst="rect">
@@ -1758,7 +1799,7 @@
         </a:p>
       </dsp:txBody>
       <dsp:txXfrm>
-        <a:off x="3248" y="1162436"/>
+        <a:off x="3248" y="1099730"/>
         <a:ext cx="1953094" cy="589850"/>
       </dsp:txXfrm>
     </dsp:sp>
@@ -1769,8 +1810,8 @@
       </dsp:nvSpPr>
       <dsp:spPr>
         <a:xfrm>
-          <a:off x="3248" y="1752287"/>
-          <a:ext cx="1953094" cy="2006595"/>
+          <a:off x="3248" y="1689581"/>
+          <a:ext cx="1953094" cy="2132007"/>
         </a:xfrm>
         <a:prstGeom prst="rect">
           <a:avLst/>
@@ -1927,8 +1968,8 @@
         </a:p>
       </dsp:txBody>
       <dsp:txXfrm>
-        <a:off x="3248" y="1752287"/>
-        <a:ext cx="1953094" cy="2006595"/>
+        <a:off x="3248" y="1689581"/>
+        <a:ext cx="1953094" cy="2132007"/>
       </dsp:txXfrm>
     </dsp:sp>
     <dsp:sp modelId="{FCFA5902-CDA4-44D7-81F4-7642CD4645E5}">
@@ -1938,7 +1979,7 @@
       </dsp:nvSpPr>
       <dsp:spPr>
         <a:xfrm>
-          <a:off x="2229776" y="1162436"/>
+          <a:off x="2229776" y="1099730"/>
           <a:ext cx="1953094" cy="589850"/>
         </a:xfrm>
         <a:prstGeom prst="rect">
@@ -2004,7 +2045,7 @@
         </a:p>
       </dsp:txBody>
       <dsp:txXfrm>
-        <a:off x="2229776" y="1162436"/>
+        <a:off x="2229776" y="1099730"/>
         <a:ext cx="1953094" cy="589850"/>
       </dsp:txXfrm>
     </dsp:sp>
@@ -2015,8 +2056,8 @@
       </dsp:nvSpPr>
       <dsp:spPr>
         <a:xfrm>
-          <a:off x="2229776" y="1752287"/>
-          <a:ext cx="1953094" cy="2006595"/>
+          <a:off x="2229776" y="1689581"/>
+          <a:ext cx="1953094" cy="2132007"/>
         </a:xfrm>
         <a:prstGeom prst="rect">
           <a:avLst/>
@@ -2109,8 +2150,8 @@
         </a:p>
       </dsp:txBody>
       <dsp:txXfrm>
-        <a:off x="2229776" y="1752287"/>
-        <a:ext cx="1953094" cy="2006595"/>
+        <a:off x="2229776" y="1689581"/>
+        <a:ext cx="1953094" cy="2132007"/>
       </dsp:txXfrm>
     </dsp:sp>
     <dsp:sp modelId="{270C6582-85ED-4E53-9018-63CDC739E4FE}">
@@ -2120,7 +2161,7 @@
       </dsp:nvSpPr>
       <dsp:spPr>
         <a:xfrm>
-          <a:off x="4456304" y="1162436"/>
+          <a:off x="4456304" y="1099730"/>
           <a:ext cx="1953094" cy="589850"/>
         </a:xfrm>
         <a:prstGeom prst="rect">
@@ -2186,7 +2227,7 @@
         </a:p>
       </dsp:txBody>
       <dsp:txXfrm>
-        <a:off x="4456304" y="1162436"/>
+        <a:off x="4456304" y="1099730"/>
         <a:ext cx="1953094" cy="589850"/>
       </dsp:txXfrm>
     </dsp:sp>
@@ -2197,8 +2238,8 @@
       </dsp:nvSpPr>
       <dsp:spPr>
         <a:xfrm>
-          <a:off x="4456304" y="1752287"/>
-          <a:ext cx="1953094" cy="2006595"/>
+          <a:off x="4456304" y="1689581"/>
+          <a:ext cx="1953094" cy="2132007"/>
         </a:xfrm>
         <a:prstGeom prst="rect">
           <a:avLst/>
@@ -2294,12 +2335,30 @@
             </a:spcAft>
             <a:buChar char="•"/>
           </a:pPr>
+          <a:r>
+            <a:rPr lang="en-GB" sz="1700" kern="1200" dirty="0"/>
+            <a:t>Easy access by a struct</a:t>
+          </a:r>
+        </a:p>
+        <a:p>
+          <a:pPr marL="171450" lvl="1" indent="-171450" algn="l" defTabSz="755650">
+            <a:lnSpc>
+              <a:spcPct val="90000"/>
+            </a:lnSpc>
+            <a:spcBef>
+              <a:spcPct val="0"/>
+            </a:spcBef>
+            <a:spcAft>
+              <a:spcPct val="15000"/>
+            </a:spcAft>
+            <a:buChar char="•"/>
+          </a:pPr>
           <a:endParaRPr lang="en-GB" sz="1700" kern="1200" dirty="0"/>
         </a:p>
       </dsp:txBody>
       <dsp:txXfrm>
-        <a:off x="4456304" y="1752287"/>
-        <a:ext cx="1953094" cy="2006595"/>
+        <a:off x="4456304" y="1689581"/>
+        <a:ext cx="1953094" cy="2132007"/>
       </dsp:txXfrm>
     </dsp:sp>
     <dsp:sp modelId="{195B9F5F-DC90-4DDE-A008-D743D5E18D83}">
@@ -2309,7 +2368,7 @@
       </dsp:nvSpPr>
       <dsp:spPr>
         <a:xfrm>
-          <a:off x="6682832" y="1162436"/>
+          <a:off x="6682832" y="1099730"/>
           <a:ext cx="1953094" cy="589850"/>
         </a:xfrm>
         <a:prstGeom prst="rect">
@@ -2375,7 +2434,7 @@
         </a:p>
       </dsp:txBody>
       <dsp:txXfrm>
-        <a:off x="6682832" y="1162436"/>
+        <a:off x="6682832" y="1099730"/>
         <a:ext cx="1953094" cy="589850"/>
       </dsp:txXfrm>
     </dsp:sp>
@@ -2386,8 +2445,8 @@
       </dsp:nvSpPr>
       <dsp:spPr>
         <a:xfrm>
-          <a:off x="6682832" y="1752287"/>
-          <a:ext cx="1953094" cy="2006595"/>
+          <a:off x="6682832" y="1689581"/>
+          <a:ext cx="1953094" cy="2132007"/>
         </a:xfrm>
         <a:prstGeom prst="rect">
           <a:avLst/>
@@ -2430,12 +2489,12 @@
         <a:fontRef idx="minor"/>
       </dsp:style>
       <dsp:txBody>
-        <a:bodyPr spcFirstLastPara="0" vert="horz" wrap="square" lIns="90678" tIns="90678" rIns="120904" bIns="136017" numCol="1" spcCol="1270" anchor="t" anchorCtr="0">
+        <a:bodyPr spcFirstLastPara="0" vert="horz" wrap="square" lIns="106680" tIns="106680" rIns="142240" bIns="160020" numCol="1" spcCol="1270" anchor="t" anchorCtr="0">
           <a:noAutofit/>
         </a:bodyPr>
         <a:lstStyle/>
         <a:p>
-          <a:pPr marL="171450" lvl="1" indent="-171450" algn="l" defTabSz="755650">
+          <a:pPr marL="228600" lvl="1" indent="-228600" algn="l" defTabSz="889000">
             <a:lnSpc>
               <a:spcPct val="90000"/>
             </a:lnSpc>
@@ -2448,12 +2507,12 @@
             <a:buChar char="•"/>
           </a:pPr>
           <a:r>
-            <a:rPr lang="en-GB" sz="1700" kern="1200" dirty="0"/>
+            <a:rPr lang="en-GB" sz="2000" kern="1200" dirty="0"/>
             <a:t>Performance</a:t>
           </a:r>
         </a:p>
         <a:p>
-          <a:pPr marL="171450" lvl="1" indent="-171450" algn="l" defTabSz="755650">
+          <a:pPr marL="228600" lvl="1" indent="-228600" algn="l" defTabSz="889000">
             <a:lnSpc>
               <a:spcPct val="90000"/>
             </a:lnSpc>
@@ -2466,14 +2525,14 @@
             <a:buChar char="•"/>
           </a:pPr>
           <a:r>
-            <a:rPr lang="en-GB" sz="1700" kern="1200" dirty="0"/>
+            <a:rPr lang="en-GB" sz="2000" kern="1200" dirty="0"/>
             <a:t>Robustness</a:t>
           </a:r>
         </a:p>
       </dsp:txBody>
       <dsp:txXfrm>
-        <a:off x="6682832" y="1752287"/>
-        <a:ext cx="1953094" cy="2006595"/>
+        <a:off x="6682832" y="1689581"/>
+        <a:ext cx="1953094" cy="2132007"/>
       </dsp:txXfrm>
     </dsp:sp>
   </dsp:spTree>
@@ -4627,7 +4686,624 @@
           <a:bodyPr lIns="0" tIns="0" rIns="0" bIns="0"/>
           <a:lstStyle/>
           <a:p>
-            <a:endParaRPr/>
+            <a:pPr marL="0" marR="0" lvl="0" indent="0" algn="l" defTabSz="914400" rtl="0" eaLnBrk="1" fontAlgn="auto" latinLnBrk="0" hangingPunct="1">
+              <a:lnSpc>
+                <a:spcPct val="100000"/>
+              </a:lnSpc>
+              <a:spcBef>
+                <a:spcPts val="0"/>
+              </a:spcBef>
+              <a:spcAft>
+                <a:spcPts val="0"/>
+              </a:spcAft>
+              <a:buClrTx/>
+              <a:buSzTx/>
+              <a:buFontTx/>
+              <a:buNone/>
+              <a:tabLst/>
+              <a:defRPr/>
+            </a:pPr>
+            <a:r>
+              <a:rPr lang="de-DE" dirty="0" err="1"/>
+              <a:t>Thank</a:t>
+            </a:r>
+            <a:r>
+              <a:rPr lang="de-DE" dirty="0"/>
+              <a:t> </a:t>
+            </a:r>
+            <a:r>
+              <a:rPr lang="de-DE" dirty="0" err="1"/>
+              <a:t>you</a:t>
+            </a:r>
+            <a:r>
+              <a:rPr lang="de-DE" dirty="0"/>
+              <a:t> Mr. Hu, also a </a:t>
+            </a:r>
+            <a:r>
+              <a:rPr lang="de-DE" dirty="0" err="1"/>
+              <a:t>good</a:t>
+            </a:r>
+            <a:r>
+              <a:rPr lang="de-DE" dirty="0"/>
+              <a:t> </a:t>
+            </a:r>
+            <a:r>
+              <a:rPr lang="de-DE" dirty="0" err="1"/>
+              <a:t>afternoon</a:t>
+            </a:r>
+            <a:r>
+              <a:rPr lang="de-DE" dirty="0"/>
+              <a:t> </a:t>
+            </a:r>
+            <a:r>
+              <a:rPr lang="de-DE" dirty="0" err="1"/>
+              <a:t>from</a:t>
+            </a:r>
+            <a:r>
+              <a:rPr lang="de-DE" dirty="0"/>
+              <a:t> </a:t>
+            </a:r>
+            <a:r>
+              <a:rPr lang="de-DE" dirty="0" err="1"/>
+              <a:t>my</a:t>
+            </a:r>
+            <a:r>
+              <a:rPr lang="de-DE" dirty="0"/>
+              <a:t> </a:t>
+            </a:r>
+            <a:r>
+              <a:rPr lang="de-DE" dirty="0" err="1"/>
+              <a:t>side</a:t>
+            </a:r>
+            <a:r>
+              <a:rPr lang="de-DE" dirty="0"/>
+              <a:t>.</a:t>
+            </a:r>
+          </a:p>
+          <a:p>
+            <a:pPr marL="0" marR="0" lvl="0" indent="0" algn="l" defTabSz="914400" rtl="0" eaLnBrk="1" fontAlgn="auto" latinLnBrk="0" hangingPunct="1">
+              <a:lnSpc>
+                <a:spcPct val="100000"/>
+              </a:lnSpc>
+              <a:spcBef>
+                <a:spcPts val="0"/>
+              </a:spcBef>
+              <a:spcAft>
+                <a:spcPts val="0"/>
+              </a:spcAft>
+              <a:buClrTx/>
+              <a:buSzTx/>
+              <a:buFontTx/>
+              <a:buNone/>
+              <a:tabLst/>
+              <a:defRPr/>
+            </a:pPr>
+            <a:r>
+              <a:rPr lang="en-US" dirty="0"/>
+              <a:t>I would start by explaining to you what a communication protocol is in information technology. </a:t>
+            </a:r>
+          </a:p>
+          <a:p>
+            <a:pPr marL="0" marR="0" lvl="0" indent="0" algn="l" defTabSz="914400" rtl="0" eaLnBrk="1" fontAlgn="auto" latinLnBrk="0" hangingPunct="1">
+              <a:lnSpc>
+                <a:spcPct val="100000"/>
+              </a:lnSpc>
+              <a:spcBef>
+                <a:spcPts val="0"/>
+              </a:spcBef>
+              <a:spcAft>
+                <a:spcPts val="0"/>
+              </a:spcAft>
+              <a:buClrTx/>
+              <a:buSzTx/>
+              <a:buFontTx/>
+              <a:buNone/>
+              <a:tabLst/>
+              <a:defRPr/>
+            </a:pPr>
+            <a:r>
+              <a:rPr lang="en-US" dirty="0"/>
+              <a:t>Basically it’s a</a:t>
+            </a:r>
+            <a:r>
+              <a:rPr lang="en-GB" dirty="0"/>
+              <a:t> set of rules allowing communication partners to transmit information.</a:t>
+            </a:r>
+          </a:p>
+          <a:p>
+            <a:pPr marL="0" marR="0" lvl="0" indent="0" algn="l" defTabSz="914400" rtl="0" eaLnBrk="1" fontAlgn="auto" latinLnBrk="0" hangingPunct="1">
+              <a:lnSpc>
+                <a:spcPct val="100000"/>
+              </a:lnSpc>
+              <a:spcBef>
+                <a:spcPts val="0"/>
+              </a:spcBef>
+              <a:spcAft>
+                <a:spcPts val="0"/>
+              </a:spcAft>
+              <a:buClrTx/>
+              <a:buSzTx/>
+              <a:buFontTx/>
+              <a:buNone/>
+              <a:tabLst/>
+              <a:defRPr/>
+            </a:pPr>
+            <a:r>
+              <a:rPr lang="en-GB" dirty="0"/>
+              <a:t>Therefore both partners have to use </a:t>
+            </a:r>
+            <a:r>
+              <a:rPr lang="en-US" dirty="0"/>
+              <a:t>a defined timing of communication actions, like transmitting data or decode some data at a </a:t>
+            </a:r>
+            <a:r>
+              <a:rPr lang="en-US" dirty="0" err="1"/>
+              <a:t>a</a:t>
+            </a:r>
+            <a:r>
+              <a:rPr lang="en-US" dirty="0"/>
+              <a:t> specified point. </a:t>
+            </a:r>
+          </a:p>
+          <a:p>
+            <a:pPr marL="0" marR="0" lvl="0" indent="0" algn="l" defTabSz="914400" rtl="0" eaLnBrk="1" fontAlgn="auto" latinLnBrk="0" hangingPunct="1">
+              <a:lnSpc>
+                <a:spcPct val="100000"/>
+              </a:lnSpc>
+              <a:spcBef>
+                <a:spcPts val="0"/>
+              </a:spcBef>
+              <a:spcAft>
+                <a:spcPts val="0"/>
+              </a:spcAft>
+              <a:buClrTx/>
+              <a:buSzTx/>
+              <a:buFontTx/>
+              <a:buNone/>
+              <a:tabLst/>
+              <a:defRPr/>
+            </a:pPr>
+            <a:r>
+              <a:rPr lang="en-US" dirty="0"/>
+              <a:t>The information both partners share are packed in so called </a:t>
+            </a:r>
+            <a:r>
+              <a:rPr lang="en-GB" dirty="0"/>
+              <a:t>PDUs, </a:t>
+            </a:r>
+            <a:r>
+              <a:rPr lang="de-DE" dirty="0" err="1"/>
+              <a:t>what</a:t>
+            </a:r>
+            <a:r>
+              <a:rPr lang="de-DE" dirty="0"/>
+              <a:t> stands </a:t>
+            </a:r>
+            <a:r>
+              <a:rPr lang="de-DE" dirty="0" err="1"/>
+              <a:t>for</a:t>
+            </a:r>
+            <a:r>
+              <a:rPr lang="de-DE" dirty="0"/>
+              <a:t> „Packet </a:t>
+            </a:r>
+            <a:r>
+              <a:rPr lang="de-DE" dirty="0" err="1"/>
+              <a:t>data</a:t>
+            </a:r>
+            <a:r>
+              <a:rPr lang="de-DE" dirty="0"/>
+              <a:t> Unit“.</a:t>
+            </a:r>
+          </a:p>
+          <a:p>
+            <a:pPr marL="0" marR="0" lvl="0" indent="0" algn="l" defTabSz="914400" rtl="0" eaLnBrk="1" fontAlgn="auto" latinLnBrk="0" hangingPunct="1">
+              <a:lnSpc>
+                <a:spcPct val="100000"/>
+              </a:lnSpc>
+              <a:spcBef>
+                <a:spcPts val="0"/>
+              </a:spcBef>
+              <a:spcAft>
+                <a:spcPts val="0"/>
+              </a:spcAft>
+              <a:buClrTx/>
+              <a:buSzTx/>
+              <a:buFontTx/>
+              <a:buNone/>
+              <a:tabLst/>
+              <a:defRPr/>
+            </a:pPr>
+            <a:r>
+              <a:rPr lang="en-US" dirty="0"/>
+              <a:t>So it must be known for what the first three bytes are, is there  a </a:t>
+            </a:r>
+            <a:r>
+              <a:rPr lang="en-US" dirty="0" err="1"/>
+              <a:t>Startbyte</a:t>
+            </a:r>
+            <a:r>
+              <a:rPr lang="en-US" dirty="0"/>
+              <a:t> for example.</a:t>
+            </a:r>
+          </a:p>
+          <a:p>
+            <a:pPr marL="0" marR="0" lvl="0" indent="0" algn="l" defTabSz="914400" rtl="0" eaLnBrk="1" fontAlgn="auto" latinLnBrk="0" hangingPunct="1">
+              <a:lnSpc>
+                <a:spcPct val="100000"/>
+              </a:lnSpc>
+              <a:spcBef>
+                <a:spcPts val="0"/>
+              </a:spcBef>
+              <a:spcAft>
+                <a:spcPts val="0"/>
+              </a:spcAft>
+              <a:buClrTx/>
+              <a:buSzTx/>
+              <a:buFontTx/>
+              <a:buNone/>
+              <a:tabLst/>
+              <a:defRPr/>
+            </a:pPr>
+            <a:endParaRPr lang="en-US" dirty="0"/>
+          </a:p>
+          <a:p>
+            <a:pPr marL="0" marR="0" lvl="0" indent="0" algn="l" defTabSz="914400" rtl="0" eaLnBrk="1" fontAlgn="auto" latinLnBrk="0" hangingPunct="1">
+              <a:lnSpc>
+                <a:spcPct val="100000"/>
+              </a:lnSpc>
+              <a:spcBef>
+                <a:spcPts val="0"/>
+              </a:spcBef>
+              <a:spcAft>
+                <a:spcPts val="0"/>
+              </a:spcAft>
+              <a:buClrTx/>
+              <a:buSzTx/>
+              <a:buFontTx/>
+              <a:buNone/>
+              <a:tabLst/>
+              <a:defRPr/>
+            </a:pPr>
+            <a:r>
+              <a:rPr lang="en-US" dirty="0"/>
+              <a:t>To achieve a successful communication, both partners need to provide </a:t>
+            </a:r>
+            <a:r>
+              <a:rPr lang="en-GB" dirty="0"/>
+              <a:t>protocol features</a:t>
+            </a:r>
+          </a:p>
+          <a:p>
+            <a:pPr marL="0" marR="0" lvl="0" indent="0" algn="l" defTabSz="914400" rtl="0" eaLnBrk="1" fontAlgn="auto" latinLnBrk="0" hangingPunct="1">
+              <a:lnSpc>
+                <a:spcPct val="100000"/>
+              </a:lnSpc>
+              <a:spcBef>
+                <a:spcPts val="0"/>
+              </a:spcBef>
+              <a:spcAft>
+                <a:spcPts val="0"/>
+              </a:spcAft>
+              <a:buClrTx/>
+              <a:buSzTx/>
+              <a:buFontTx/>
+              <a:buNone/>
+              <a:tabLst/>
+              <a:defRPr/>
+            </a:pPr>
+            <a:r>
+              <a:rPr lang="en-GB" dirty="0"/>
+              <a:t>-&gt; De-/Encoding of PDUs</a:t>
+            </a:r>
+          </a:p>
+          <a:p>
+            <a:pPr marL="0" marR="0" lvl="0" indent="0" algn="l" defTabSz="914400" rtl="0" eaLnBrk="1" fontAlgn="auto" latinLnBrk="0" hangingPunct="1">
+              <a:lnSpc>
+                <a:spcPct val="100000"/>
+              </a:lnSpc>
+              <a:spcBef>
+                <a:spcPts val="0"/>
+              </a:spcBef>
+              <a:spcAft>
+                <a:spcPts val="0"/>
+              </a:spcAft>
+              <a:buClrTx/>
+              <a:buSzTx/>
+              <a:buFontTx/>
+              <a:buNone/>
+              <a:tabLst/>
+              <a:defRPr/>
+            </a:pPr>
+            <a:r>
+              <a:rPr lang="en-GB" dirty="0"/>
+              <a:t>-&gt; Error detection, to detect errors while transmission</a:t>
+            </a:r>
+          </a:p>
+          <a:p>
+            <a:pPr marL="0" marR="0" lvl="0" indent="0" algn="l" defTabSz="914400" rtl="0" eaLnBrk="1" fontAlgn="auto" latinLnBrk="0" hangingPunct="1">
+              <a:lnSpc>
+                <a:spcPct val="100000"/>
+              </a:lnSpc>
+              <a:spcBef>
+                <a:spcPts val="0"/>
+              </a:spcBef>
+              <a:spcAft>
+                <a:spcPts val="0"/>
+              </a:spcAft>
+              <a:buClrTx/>
+              <a:buSzTx/>
+              <a:buFontTx/>
+              <a:buNone/>
+              <a:tabLst/>
+              <a:defRPr/>
+            </a:pPr>
+            <a:endParaRPr lang="en-GB" dirty="0"/>
+          </a:p>
+          <a:p>
+            <a:pPr marL="0" marR="0" lvl="0" indent="0" algn="l" defTabSz="914400" rtl="0" eaLnBrk="1" fontAlgn="auto" latinLnBrk="0" hangingPunct="1">
+              <a:lnSpc>
+                <a:spcPct val="100000"/>
+              </a:lnSpc>
+              <a:spcBef>
+                <a:spcPts val="0"/>
+              </a:spcBef>
+              <a:spcAft>
+                <a:spcPts val="0"/>
+              </a:spcAft>
+              <a:buClrTx/>
+              <a:buSzTx/>
+              <a:buFontTx/>
+              <a:buNone/>
+              <a:tabLst/>
+              <a:defRPr/>
+            </a:pPr>
+            <a:r>
+              <a:rPr lang="de-DE" dirty="0"/>
+              <a:t>An </a:t>
+            </a:r>
+            <a:r>
+              <a:rPr lang="de-DE" dirty="0" err="1"/>
+              <a:t>important</a:t>
+            </a:r>
+            <a:r>
+              <a:rPr lang="de-DE" dirty="0"/>
+              <a:t> </a:t>
+            </a:r>
+            <a:r>
+              <a:rPr lang="de-DE" dirty="0" err="1"/>
+              <a:t>term</a:t>
+            </a:r>
+            <a:r>
+              <a:rPr lang="de-DE" dirty="0"/>
+              <a:t> in </a:t>
+            </a:r>
+            <a:r>
+              <a:rPr lang="de-DE" dirty="0" err="1"/>
+              <a:t>protocol</a:t>
+            </a:r>
+            <a:r>
+              <a:rPr lang="de-DE" dirty="0"/>
+              <a:t> </a:t>
+            </a:r>
+            <a:r>
+              <a:rPr lang="de-DE" dirty="0" err="1"/>
+              <a:t>technology</a:t>
+            </a:r>
+            <a:r>
+              <a:rPr lang="de-DE" dirty="0"/>
+              <a:t> </a:t>
+            </a:r>
+            <a:r>
+              <a:rPr lang="de-DE" dirty="0" err="1"/>
+              <a:t>is</a:t>
+            </a:r>
+            <a:r>
+              <a:rPr lang="de-DE" dirty="0"/>
+              <a:t> </a:t>
+            </a:r>
+            <a:r>
+              <a:rPr lang="de-DE" dirty="0" err="1"/>
+              <a:t>the</a:t>
+            </a:r>
+            <a:r>
+              <a:rPr lang="de-DE" dirty="0"/>
+              <a:t> </a:t>
+            </a:r>
+            <a:r>
+              <a:rPr lang="de-DE" dirty="0" err="1"/>
+              <a:t>layer</a:t>
+            </a:r>
+            <a:r>
+              <a:rPr lang="de-DE" dirty="0"/>
+              <a:t>.</a:t>
+            </a:r>
+          </a:p>
+          <a:p>
+            <a:pPr marL="0" marR="0" lvl="0" indent="0" algn="l" defTabSz="914400" rtl="0" eaLnBrk="1" fontAlgn="auto" latinLnBrk="0" hangingPunct="1">
+              <a:lnSpc>
+                <a:spcPct val="100000"/>
+              </a:lnSpc>
+              <a:spcBef>
+                <a:spcPts val="0"/>
+              </a:spcBef>
+              <a:spcAft>
+                <a:spcPts val="0"/>
+              </a:spcAft>
+              <a:buClrTx/>
+              <a:buSzTx/>
+              <a:buFontTx/>
+              <a:buNone/>
+              <a:tabLst/>
+              <a:defRPr/>
+            </a:pPr>
+            <a:r>
+              <a:rPr lang="de-DE" dirty="0" err="1"/>
+              <a:t>Basically</a:t>
+            </a:r>
+            <a:r>
+              <a:rPr lang="de-DE" dirty="0"/>
+              <a:t> </a:t>
+            </a:r>
+            <a:r>
+              <a:rPr lang="de-DE" dirty="0" err="1"/>
+              <a:t>each</a:t>
+            </a:r>
+            <a:r>
+              <a:rPr lang="de-DE" dirty="0"/>
+              <a:t> </a:t>
+            </a:r>
+            <a:r>
+              <a:rPr lang="de-DE" dirty="0" err="1"/>
+              <a:t>layer</a:t>
+            </a:r>
+            <a:r>
+              <a:rPr lang="de-DE" dirty="0"/>
+              <a:t> </a:t>
+            </a:r>
+            <a:r>
+              <a:rPr lang="de-DE" dirty="0" err="1"/>
+              <a:t>provides</a:t>
+            </a:r>
+            <a:r>
+              <a:rPr lang="de-DE" dirty="0"/>
+              <a:t> </a:t>
+            </a:r>
+            <a:r>
+              <a:rPr lang="de-DE" dirty="0" err="1"/>
+              <a:t>functions</a:t>
+            </a:r>
+            <a:r>
+              <a:rPr lang="de-DE" dirty="0"/>
+              <a:t> </a:t>
+            </a:r>
+            <a:r>
+              <a:rPr lang="en-US" dirty="0"/>
+              <a:t>to fulfill a specific goal. </a:t>
+            </a:r>
+          </a:p>
+          <a:p>
+            <a:pPr marL="0" marR="0" lvl="0" indent="0" algn="l" defTabSz="914400" rtl="0" eaLnBrk="1" fontAlgn="auto" latinLnBrk="0" hangingPunct="1">
+              <a:lnSpc>
+                <a:spcPct val="100000"/>
+              </a:lnSpc>
+              <a:spcBef>
+                <a:spcPts val="0"/>
+              </a:spcBef>
+              <a:spcAft>
+                <a:spcPts val="0"/>
+              </a:spcAft>
+              <a:buClrTx/>
+              <a:buSzTx/>
+              <a:buFontTx/>
+              <a:buNone/>
+              <a:tabLst/>
+              <a:defRPr/>
+            </a:pPr>
+            <a:r>
+              <a:rPr lang="en-GB" dirty="0"/>
+              <a:t>-&gt; serves the layer above and is served by the layer below (but does not need to know how the other layers are implemented)</a:t>
+            </a:r>
+          </a:p>
+          <a:p>
+            <a:pPr marL="0" marR="0" lvl="0" indent="0" algn="l" defTabSz="914400" rtl="0" eaLnBrk="1" fontAlgn="auto" latinLnBrk="0" hangingPunct="1">
+              <a:lnSpc>
+                <a:spcPct val="100000"/>
+              </a:lnSpc>
+              <a:spcBef>
+                <a:spcPts val="0"/>
+              </a:spcBef>
+              <a:spcAft>
+                <a:spcPts val="0"/>
+              </a:spcAft>
+              <a:buClrTx/>
+              <a:buSzTx/>
+              <a:buFontTx/>
+              <a:buNone/>
+              <a:tabLst/>
+              <a:defRPr/>
+            </a:pPr>
+            <a:endParaRPr lang="en-US" dirty="0"/>
+          </a:p>
+          <a:p>
+            <a:pPr marL="0" marR="0" lvl="0" indent="0" algn="l" defTabSz="914400" rtl="0" eaLnBrk="1" fontAlgn="auto" latinLnBrk="0" hangingPunct="1">
+              <a:lnSpc>
+                <a:spcPct val="100000"/>
+              </a:lnSpc>
+              <a:spcBef>
+                <a:spcPts val="0"/>
+              </a:spcBef>
+              <a:spcAft>
+                <a:spcPts val="0"/>
+              </a:spcAft>
+              <a:buClrTx/>
+              <a:buSzTx/>
+              <a:buFontTx/>
+              <a:buNone/>
+              <a:tabLst/>
+              <a:defRPr/>
+            </a:pPr>
+            <a:endParaRPr lang="en-US" dirty="0"/>
+          </a:p>
+          <a:p>
+            <a:pPr marL="0" marR="0" lvl="0" indent="0" algn="l" defTabSz="914400" rtl="0" eaLnBrk="1" fontAlgn="auto" latinLnBrk="0" hangingPunct="1">
+              <a:lnSpc>
+                <a:spcPct val="100000"/>
+              </a:lnSpc>
+              <a:spcBef>
+                <a:spcPts val="0"/>
+              </a:spcBef>
+              <a:spcAft>
+                <a:spcPts val="0"/>
+              </a:spcAft>
+              <a:buClrTx/>
+              <a:buSzTx/>
+              <a:buFontTx/>
+              <a:buNone/>
+              <a:tabLst/>
+              <a:defRPr/>
+            </a:pPr>
+            <a:endParaRPr lang="en-US" dirty="0"/>
+          </a:p>
+          <a:p>
+            <a:pPr marL="0" marR="0" lvl="0" indent="0" algn="l" defTabSz="914400" rtl="0" eaLnBrk="1" fontAlgn="auto" latinLnBrk="0" hangingPunct="1">
+              <a:lnSpc>
+                <a:spcPct val="100000"/>
+              </a:lnSpc>
+              <a:spcBef>
+                <a:spcPts val="0"/>
+              </a:spcBef>
+              <a:spcAft>
+                <a:spcPts val="0"/>
+              </a:spcAft>
+              <a:buClrTx/>
+              <a:buSzTx/>
+              <a:buFontTx/>
+              <a:buNone/>
+              <a:tabLst/>
+              <a:defRPr/>
+            </a:pPr>
+            <a:endParaRPr lang="en-US" dirty="0"/>
+          </a:p>
+          <a:p>
+            <a:pPr marL="0" marR="0" lvl="0" indent="0" algn="l" defTabSz="914400" rtl="0" eaLnBrk="1" fontAlgn="auto" latinLnBrk="0" hangingPunct="1">
+              <a:lnSpc>
+                <a:spcPct val="100000"/>
+              </a:lnSpc>
+              <a:spcBef>
+                <a:spcPts val="0"/>
+              </a:spcBef>
+              <a:spcAft>
+                <a:spcPts val="0"/>
+              </a:spcAft>
+              <a:buClrTx/>
+              <a:buSzTx/>
+              <a:buFontTx/>
+              <a:buNone/>
+              <a:tabLst/>
+              <a:defRPr/>
+            </a:pPr>
+            <a:endParaRPr dirty="0"/>
           </a:p>
         </p:txBody>
       </p:sp>
@@ -4820,7 +5496,913 @@
           <a:bodyPr lIns="0" tIns="0" rIns="0" bIns="0"/>
           <a:lstStyle/>
           <a:p>
-            <a:endParaRPr/>
+            <a:r>
+              <a:rPr lang="en-US" dirty="0"/>
+              <a:t>To clarify the basics mentioned, we take a look at the protocol we designed.</a:t>
+            </a:r>
+          </a:p>
+          <a:p>
+            <a:r>
+              <a:rPr lang="en-US" dirty="0"/>
+              <a:t>While the design process the waterfall model was used. </a:t>
+            </a:r>
+          </a:p>
+          <a:p>
+            <a:r>
+              <a:rPr lang="en-US" dirty="0"/>
+              <a:t>This method intends a requirement analysis as the first step. </a:t>
+            </a:r>
+          </a:p>
+          <a:p>
+            <a:r>
+              <a:rPr lang="en-US" dirty="0"/>
+              <a:t>Here different requirements were set, like the protocol needs to be robust.</a:t>
+            </a:r>
+          </a:p>
+          <a:p>
+            <a:r>
+              <a:rPr lang="en-US" dirty="0"/>
+              <a:t>In this context robust means, that </a:t>
+            </a:r>
+            <a:r>
+              <a:rPr lang="de-DE" dirty="0" err="1"/>
+              <a:t>transmission</a:t>
+            </a:r>
+            <a:r>
+              <a:rPr lang="de-DE" dirty="0"/>
+              <a:t> </a:t>
+            </a:r>
+            <a:r>
+              <a:rPr lang="de-DE" dirty="0" err="1"/>
+              <a:t>errors</a:t>
+            </a:r>
+            <a:r>
+              <a:rPr lang="de-DE" dirty="0"/>
+              <a:t> </a:t>
+            </a:r>
+            <a:r>
+              <a:rPr lang="de-DE" dirty="0" err="1"/>
+              <a:t>need</a:t>
+            </a:r>
+            <a:r>
+              <a:rPr lang="de-DE" dirty="0"/>
+              <a:t> </a:t>
+            </a:r>
+            <a:r>
+              <a:rPr lang="de-DE" dirty="0" err="1"/>
+              <a:t>to</a:t>
+            </a:r>
+            <a:r>
+              <a:rPr lang="de-DE" dirty="0"/>
+              <a:t> </a:t>
+            </a:r>
+            <a:r>
+              <a:rPr lang="de-DE" dirty="0" err="1"/>
+              <a:t>be</a:t>
+            </a:r>
+            <a:r>
+              <a:rPr lang="de-DE" dirty="0"/>
+              <a:t> </a:t>
+            </a:r>
+            <a:r>
+              <a:rPr lang="de-DE" dirty="0" err="1"/>
+              <a:t>detected</a:t>
+            </a:r>
+            <a:r>
+              <a:rPr lang="de-DE" dirty="0"/>
+              <a:t> and </a:t>
+            </a:r>
+            <a:r>
+              <a:rPr lang="de-DE" dirty="0" err="1"/>
+              <a:t>handeld</a:t>
+            </a:r>
+            <a:r>
+              <a:rPr lang="de-DE" dirty="0"/>
+              <a:t> AND </a:t>
+            </a:r>
+            <a:r>
+              <a:rPr lang="de-DE" dirty="0" err="1"/>
+              <a:t>there</a:t>
+            </a:r>
+            <a:r>
+              <a:rPr lang="de-DE" dirty="0"/>
+              <a:t> </a:t>
+            </a:r>
+            <a:r>
+              <a:rPr lang="de-DE" dirty="0" err="1"/>
+              <a:t>should</a:t>
+            </a:r>
+            <a:r>
+              <a:rPr lang="de-DE" dirty="0"/>
+              <a:t> </a:t>
+            </a:r>
+            <a:r>
+              <a:rPr lang="de-DE" dirty="0" err="1"/>
+              <a:t>never</a:t>
+            </a:r>
+            <a:r>
+              <a:rPr lang="de-DE" dirty="0"/>
+              <a:t> </a:t>
+            </a:r>
+            <a:r>
+              <a:rPr lang="de-DE" dirty="0" err="1"/>
+              <a:t>be</a:t>
+            </a:r>
+            <a:r>
+              <a:rPr lang="de-DE" dirty="0"/>
+              <a:t> a Live- </a:t>
+            </a:r>
+            <a:r>
+              <a:rPr lang="de-DE" dirty="0" err="1"/>
+              <a:t>or</a:t>
+            </a:r>
+            <a:r>
+              <a:rPr lang="de-DE" dirty="0"/>
+              <a:t> a Deadlock. So </a:t>
+            </a:r>
+            <a:r>
+              <a:rPr lang="en-US" dirty="0"/>
+              <a:t>the program must never hang up.</a:t>
+            </a:r>
+          </a:p>
+          <a:p>
+            <a:endParaRPr lang="en-US" dirty="0"/>
+          </a:p>
+          <a:p>
+            <a:r>
+              <a:rPr lang="en-US" dirty="0"/>
+              <a:t>The transfer needs to be fast of course, to reach a high data </a:t>
+            </a:r>
+            <a:r>
+              <a:rPr lang="en-US" dirty="0" err="1"/>
+              <a:t>throuput</a:t>
+            </a:r>
+            <a:r>
+              <a:rPr lang="en-US" dirty="0"/>
+              <a:t> (so the </a:t>
+            </a:r>
+            <a:r>
+              <a:rPr lang="en-US" dirty="0" err="1"/>
+              <a:t>hexacopter</a:t>
+            </a:r>
+            <a:r>
+              <a:rPr lang="en-US" dirty="0"/>
+              <a:t> can be </a:t>
+            </a:r>
+            <a:r>
+              <a:rPr lang="de-DE" dirty="0" err="1"/>
+              <a:t>stably</a:t>
+            </a:r>
+            <a:r>
+              <a:rPr lang="de-DE" dirty="0"/>
+              <a:t> </a:t>
+            </a:r>
+            <a:r>
+              <a:rPr lang="de-DE" dirty="0" err="1"/>
+              <a:t>controlled</a:t>
+            </a:r>
+            <a:r>
+              <a:rPr lang="en-US" dirty="0"/>
+              <a:t>).</a:t>
+            </a:r>
+          </a:p>
+          <a:p>
+            <a:r>
+              <a:rPr lang="de-DE" dirty="0" err="1"/>
+              <a:t>For</a:t>
+            </a:r>
+            <a:r>
+              <a:rPr lang="de-DE" dirty="0"/>
+              <a:t> </a:t>
+            </a:r>
+            <a:r>
+              <a:rPr lang="de-DE" dirty="0" err="1"/>
+              <a:t>the</a:t>
+            </a:r>
+            <a:r>
+              <a:rPr lang="de-DE" dirty="0"/>
+              <a:t> same </a:t>
+            </a:r>
+            <a:r>
+              <a:rPr lang="de-DE" dirty="0" err="1"/>
+              <a:t>reason</a:t>
+            </a:r>
+            <a:r>
+              <a:rPr lang="de-DE" dirty="0"/>
+              <a:t> </a:t>
+            </a:r>
+            <a:r>
+              <a:rPr lang="de-DE" dirty="0" err="1"/>
+              <a:t>the</a:t>
+            </a:r>
+            <a:r>
+              <a:rPr lang="de-DE" dirty="0"/>
+              <a:t> hole </a:t>
+            </a:r>
+            <a:r>
+              <a:rPr lang="de-DE" dirty="0" err="1"/>
+              <a:t>implementation</a:t>
+            </a:r>
+            <a:r>
+              <a:rPr lang="de-DE" dirty="0"/>
+              <a:t> </a:t>
+            </a:r>
+            <a:r>
+              <a:rPr lang="de-DE" dirty="0" err="1"/>
+              <a:t>needs</a:t>
+            </a:r>
+            <a:r>
+              <a:rPr lang="de-DE" dirty="0"/>
+              <a:t> </a:t>
+            </a:r>
+            <a:r>
+              <a:rPr lang="de-DE" dirty="0" err="1"/>
+              <a:t>to</a:t>
+            </a:r>
+            <a:r>
+              <a:rPr lang="de-DE" dirty="0"/>
+              <a:t> </a:t>
+            </a:r>
+            <a:r>
+              <a:rPr lang="de-DE" dirty="0" err="1"/>
+              <a:t>be</a:t>
+            </a:r>
+            <a:r>
+              <a:rPr lang="de-DE" dirty="0"/>
+              <a:t> </a:t>
+            </a:r>
+            <a:r>
+              <a:rPr lang="de-DE" dirty="0" err="1"/>
+              <a:t>realtime</a:t>
+            </a:r>
+            <a:r>
+              <a:rPr lang="de-DE" dirty="0"/>
+              <a:t> – </a:t>
+            </a:r>
+            <a:r>
+              <a:rPr lang="de-DE" dirty="0" err="1"/>
+              <a:t>capable</a:t>
+            </a:r>
+            <a:r>
+              <a:rPr lang="de-DE" dirty="0"/>
+              <a:t>.</a:t>
+            </a:r>
+          </a:p>
+          <a:p>
+            <a:endParaRPr lang="de-DE" dirty="0"/>
+          </a:p>
+          <a:p>
+            <a:r>
+              <a:rPr lang="de-DE" dirty="0"/>
+              <a:t>Last but not least, </a:t>
+            </a:r>
+            <a:r>
+              <a:rPr lang="de-DE" dirty="0" err="1"/>
+              <a:t>the</a:t>
+            </a:r>
+            <a:r>
+              <a:rPr lang="de-DE" dirty="0"/>
+              <a:t> </a:t>
+            </a:r>
+            <a:r>
+              <a:rPr lang="de-DE" dirty="0" err="1"/>
+              <a:t>implementation</a:t>
+            </a:r>
+            <a:r>
+              <a:rPr lang="de-DE" dirty="0"/>
+              <a:t> </a:t>
+            </a:r>
+            <a:r>
+              <a:rPr lang="de-DE" dirty="0" err="1"/>
+              <a:t>should</a:t>
+            </a:r>
+            <a:r>
+              <a:rPr lang="de-DE" dirty="0"/>
+              <a:t> </a:t>
+            </a:r>
+            <a:r>
+              <a:rPr lang="de-DE" dirty="0" err="1"/>
+              <a:t>be</a:t>
+            </a:r>
+            <a:r>
+              <a:rPr lang="de-DE" dirty="0"/>
+              <a:t> </a:t>
+            </a:r>
+            <a:r>
+              <a:rPr lang="de-DE" dirty="0" err="1"/>
+              <a:t>easily</a:t>
+            </a:r>
+            <a:r>
+              <a:rPr lang="de-DE" dirty="0"/>
+              <a:t> </a:t>
+            </a:r>
+            <a:r>
+              <a:rPr lang="de-DE" dirty="0" err="1"/>
+              <a:t>expandable</a:t>
+            </a:r>
+            <a:r>
+              <a:rPr lang="de-DE" dirty="0"/>
+              <a:t>, so </a:t>
+            </a:r>
+            <a:r>
+              <a:rPr lang="de-DE" dirty="0" err="1"/>
+              <a:t>it</a:t>
+            </a:r>
+            <a:r>
+              <a:rPr lang="de-DE" dirty="0"/>
+              <a:t> </a:t>
+            </a:r>
+            <a:r>
+              <a:rPr lang="de-DE" dirty="0" err="1"/>
+              <a:t>should</a:t>
+            </a:r>
+            <a:r>
+              <a:rPr lang="de-DE" dirty="0"/>
+              <a:t> </a:t>
+            </a:r>
+            <a:r>
+              <a:rPr lang="de-DE" dirty="0" err="1"/>
+              <a:t>be</a:t>
+            </a:r>
+            <a:r>
+              <a:rPr lang="de-DE" dirty="0"/>
+              <a:t> possible </a:t>
+            </a:r>
+            <a:r>
+              <a:rPr lang="de-DE" dirty="0" err="1"/>
+              <a:t>to</a:t>
+            </a:r>
+            <a:r>
+              <a:rPr lang="de-DE" dirty="0"/>
+              <a:t> </a:t>
+            </a:r>
+            <a:r>
+              <a:rPr lang="de-DE" dirty="0" err="1"/>
+              <a:t>add</a:t>
+            </a:r>
+            <a:r>
+              <a:rPr lang="de-DE" dirty="0"/>
+              <a:t> and </a:t>
+            </a:r>
+            <a:r>
+              <a:rPr lang="de-DE" dirty="0" err="1"/>
+              <a:t>remove</a:t>
+            </a:r>
+            <a:r>
+              <a:rPr lang="de-DE" dirty="0"/>
+              <a:t> </a:t>
+            </a:r>
+            <a:r>
+              <a:rPr lang="de-DE" dirty="0" err="1"/>
+              <a:t>new</a:t>
+            </a:r>
+            <a:r>
+              <a:rPr lang="de-DE" dirty="0"/>
+              <a:t> </a:t>
+            </a:r>
+            <a:r>
+              <a:rPr lang="de-DE" dirty="0" err="1"/>
+              <a:t>sensory</a:t>
+            </a:r>
+            <a:r>
+              <a:rPr lang="de-DE" dirty="0"/>
+              <a:t> </a:t>
+            </a:r>
+            <a:r>
+              <a:rPr lang="de-DE" dirty="0" err="1"/>
+              <a:t>by</a:t>
+            </a:r>
+            <a:r>
+              <a:rPr lang="de-DE" dirty="0"/>
+              <a:t> </a:t>
+            </a:r>
+            <a:r>
+              <a:rPr lang="de-DE" dirty="0" err="1"/>
+              <a:t>small</a:t>
+            </a:r>
+            <a:r>
+              <a:rPr lang="de-DE" dirty="0"/>
+              <a:t> </a:t>
+            </a:r>
+            <a:r>
+              <a:rPr lang="de-DE" dirty="0" err="1"/>
+              <a:t>effort</a:t>
+            </a:r>
+            <a:r>
+              <a:rPr lang="de-DE" dirty="0"/>
+              <a:t>.</a:t>
+            </a:r>
+          </a:p>
+          <a:p>
+            <a:endParaRPr lang="de-DE" dirty="0"/>
+          </a:p>
+          <a:p>
+            <a:pPr marL="0" marR="0" lvl="0" indent="0" algn="l" defTabSz="914400" rtl="0" eaLnBrk="1" fontAlgn="auto" latinLnBrk="0" hangingPunct="1">
+              <a:lnSpc>
+                <a:spcPct val="100000"/>
+              </a:lnSpc>
+              <a:spcBef>
+                <a:spcPts val="0"/>
+              </a:spcBef>
+              <a:spcAft>
+                <a:spcPts val="0"/>
+              </a:spcAft>
+              <a:buClrTx/>
+              <a:buSzTx/>
+              <a:buFontTx/>
+              <a:buNone/>
+              <a:tabLst/>
+              <a:defRPr/>
+            </a:pPr>
+            <a:r>
+              <a:rPr lang="de-DE" dirty="0"/>
+              <a:t>The </a:t>
+            </a:r>
+            <a:r>
+              <a:rPr lang="de-DE" dirty="0" err="1"/>
+              <a:t>next</a:t>
+            </a:r>
+            <a:r>
+              <a:rPr lang="de-DE" dirty="0"/>
+              <a:t> </a:t>
+            </a:r>
+            <a:r>
+              <a:rPr lang="de-DE" dirty="0" err="1"/>
+              <a:t>step</a:t>
+            </a:r>
+            <a:r>
+              <a:rPr lang="de-DE" dirty="0"/>
+              <a:t> </a:t>
+            </a:r>
+            <a:r>
+              <a:rPr lang="de-DE" dirty="0" err="1"/>
+              <a:t>is</a:t>
+            </a:r>
+            <a:r>
+              <a:rPr lang="de-DE" dirty="0"/>
+              <a:t> </a:t>
+            </a:r>
+            <a:r>
+              <a:rPr lang="de-DE" dirty="0" err="1"/>
+              <a:t>the</a:t>
+            </a:r>
+            <a:r>
+              <a:rPr lang="de-DE" dirty="0"/>
+              <a:t> </a:t>
+            </a:r>
+            <a:r>
+              <a:rPr lang="de-DE" dirty="0" err="1"/>
+              <a:t>protocol</a:t>
+            </a:r>
+            <a:r>
+              <a:rPr lang="de-DE" dirty="0"/>
+              <a:t> design. </a:t>
+            </a:r>
+            <a:r>
+              <a:rPr lang="de-DE" dirty="0" err="1"/>
+              <a:t>Our</a:t>
+            </a:r>
+            <a:r>
+              <a:rPr lang="de-DE" dirty="0"/>
+              <a:t> </a:t>
+            </a:r>
+            <a:r>
+              <a:rPr lang="de-DE" dirty="0" err="1"/>
+              <a:t>protocol</a:t>
+            </a:r>
+            <a:r>
+              <a:rPr lang="de-DE" dirty="0"/>
+              <a:t> </a:t>
+            </a:r>
+            <a:r>
+              <a:rPr lang="de-DE" dirty="0" err="1"/>
+              <a:t>is</a:t>
+            </a:r>
+            <a:r>
+              <a:rPr lang="de-DE" dirty="0"/>
+              <a:t> </a:t>
+            </a:r>
+            <a:r>
+              <a:rPr lang="de-DE" dirty="0" err="1"/>
+              <a:t>based</a:t>
+            </a:r>
+            <a:r>
+              <a:rPr lang="de-DE" dirty="0"/>
+              <a:t> on COBS (</a:t>
+            </a:r>
+            <a:r>
+              <a:rPr lang="en-GB" sz="1200" b="0" dirty="0"/>
+              <a:t>Consistent Overhead Byte Stuffing</a:t>
+            </a:r>
+            <a:r>
+              <a:rPr lang="de-DE" dirty="0"/>
+              <a:t>), I will </a:t>
+            </a:r>
+            <a:r>
+              <a:rPr lang="de-DE" dirty="0" err="1"/>
+              <a:t>go</a:t>
+            </a:r>
+            <a:r>
+              <a:rPr lang="de-DE" dirty="0"/>
+              <a:t> </a:t>
+            </a:r>
+            <a:r>
+              <a:rPr lang="de-DE" dirty="0" err="1"/>
+              <a:t>into</a:t>
+            </a:r>
+            <a:r>
+              <a:rPr lang="de-DE" dirty="0"/>
+              <a:t> </a:t>
+            </a:r>
+            <a:r>
+              <a:rPr lang="de-DE" dirty="0" err="1"/>
+              <a:t>more</a:t>
+            </a:r>
+            <a:r>
+              <a:rPr lang="de-DE" dirty="0"/>
+              <a:t> </a:t>
+            </a:r>
+            <a:r>
+              <a:rPr lang="de-DE" dirty="0" err="1"/>
+              <a:t>detail</a:t>
+            </a:r>
+            <a:r>
+              <a:rPr lang="de-DE" dirty="0"/>
+              <a:t> on </a:t>
+            </a:r>
+            <a:r>
+              <a:rPr lang="de-DE" dirty="0" err="1"/>
+              <a:t>the</a:t>
+            </a:r>
+            <a:r>
+              <a:rPr lang="de-DE" dirty="0"/>
+              <a:t> </a:t>
+            </a:r>
+            <a:r>
+              <a:rPr lang="de-DE" dirty="0" err="1"/>
+              <a:t>next</a:t>
+            </a:r>
+            <a:r>
+              <a:rPr lang="de-DE" dirty="0"/>
+              <a:t> </a:t>
+            </a:r>
+            <a:r>
+              <a:rPr lang="de-DE" dirty="0" err="1"/>
+              <a:t>slide</a:t>
+            </a:r>
+            <a:r>
+              <a:rPr lang="de-DE" dirty="0"/>
+              <a:t>. </a:t>
+            </a:r>
+          </a:p>
+          <a:p>
+            <a:pPr marL="0" marR="0" lvl="0" indent="0" algn="l" defTabSz="914400" rtl="0" eaLnBrk="1" fontAlgn="auto" latinLnBrk="0" hangingPunct="1">
+              <a:lnSpc>
+                <a:spcPct val="100000"/>
+              </a:lnSpc>
+              <a:spcBef>
+                <a:spcPts val="0"/>
+              </a:spcBef>
+              <a:spcAft>
+                <a:spcPts val="0"/>
+              </a:spcAft>
+              <a:buClrTx/>
+              <a:buSzTx/>
+              <a:buFontTx/>
+              <a:buNone/>
+              <a:tabLst/>
+              <a:defRPr/>
+            </a:pPr>
+            <a:r>
+              <a:rPr lang="de-DE" dirty="0" err="1"/>
+              <a:t>For</a:t>
+            </a:r>
+            <a:r>
+              <a:rPr lang="de-DE" dirty="0"/>
+              <a:t> </a:t>
+            </a:r>
+            <a:r>
+              <a:rPr lang="de-DE" dirty="0" err="1"/>
+              <a:t>the</a:t>
+            </a:r>
+            <a:r>
+              <a:rPr lang="de-DE" dirty="0"/>
+              <a:t> </a:t>
+            </a:r>
+            <a:r>
+              <a:rPr lang="en-GB" dirty="0"/>
+              <a:t>Error detection the Fletchers Checksum is used. This means, we are calculating a checksum </a:t>
+            </a:r>
+            <a:r>
+              <a:rPr lang="en-US" dirty="0"/>
+              <a:t>based on the byte sequence to be sent. This calculated Checksum is then </a:t>
+            </a:r>
+            <a:r>
+              <a:rPr lang="de-DE" dirty="0" err="1"/>
+              <a:t>attached</a:t>
+            </a:r>
+            <a:r>
+              <a:rPr lang="de-DE" dirty="0"/>
+              <a:t> </a:t>
+            </a:r>
+            <a:r>
+              <a:rPr lang="de-DE" dirty="0" err="1"/>
+              <a:t>to</a:t>
+            </a:r>
+            <a:r>
+              <a:rPr lang="de-DE" dirty="0"/>
+              <a:t> </a:t>
+            </a:r>
+            <a:r>
+              <a:rPr lang="de-DE" dirty="0" err="1"/>
+              <a:t>the</a:t>
+            </a:r>
+            <a:r>
+              <a:rPr lang="de-DE" dirty="0"/>
+              <a:t> send-</a:t>
+            </a:r>
+            <a:r>
+              <a:rPr lang="de-DE" dirty="0" err="1"/>
+              <a:t>package</a:t>
+            </a:r>
+            <a:r>
+              <a:rPr lang="de-DE" dirty="0"/>
+              <a:t>, and </a:t>
+            </a:r>
+            <a:r>
+              <a:rPr lang="de-DE" dirty="0" err="1"/>
+              <a:t>can</a:t>
+            </a:r>
+            <a:r>
+              <a:rPr lang="de-DE" dirty="0"/>
+              <a:t> </a:t>
+            </a:r>
+            <a:r>
+              <a:rPr lang="de-DE" dirty="0" err="1"/>
+              <a:t>be</a:t>
+            </a:r>
+            <a:r>
+              <a:rPr lang="de-DE" dirty="0"/>
+              <a:t> </a:t>
+            </a:r>
+            <a:r>
+              <a:rPr lang="de-DE" dirty="0" err="1"/>
+              <a:t>checked</a:t>
+            </a:r>
+            <a:r>
+              <a:rPr lang="de-DE" dirty="0"/>
+              <a:t> on </a:t>
+            </a:r>
+            <a:r>
+              <a:rPr lang="de-DE" dirty="0" err="1"/>
+              <a:t>the</a:t>
+            </a:r>
+            <a:r>
+              <a:rPr lang="de-DE" dirty="0"/>
+              <a:t> </a:t>
+            </a:r>
+            <a:r>
+              <a:rPr lang="de-DE" dirty="0" err="1"/>
+              <a:t>receiving</a:t>
+            </a:r>
+            <a:r>
+              <a:rPr lang="de-DE" dirty="0"/>
+              <a:t> </a:t>
+            </a:r>
+            <a:r>
+              <a:rPr lang="de-DE" dirty="0" err="1"/>
+              <a:t>side</a:t>
+            </a:r>
+            <a:r>
+              <a:rPr lang="de-DE" dirty="0"/>
+              <a:t>. </a:t>
+            </a:r>
+          </a:p>
+          <a:p>
+            <a:pPr marL="0" marR="0" lvl="0" indent="0" algn="l" defTabSz="914400" rtl="0" eaLnBrk="1" fontAlgn="auto" latinLnBrk="0" hangingPunct="1">
+              <a:lnSpc>
+                <a:spcPct val="100000"/>
+              </a:lnSpc>
+              <a:spcBef>
+                <a:spcPts val="0"/>
+              </a:spcBef>
+              <a:spcAft>
+                <a:spcPts val="0"/>
+              </a:spcAft>
+              <a:buClrTx/>
+              <a:buSzTx/>
+              <a:buFontTx/>
+              <a:buNone/>
+              <a:tabLst/>
+              <a:defRPr/>
+            </a:pPr>
+            <a:endParaRPr lang="de-DE" dirty="0"/>
+          </a:p>
+          <a:p>
+            <a:r>
+              <a:rPr lang="en-GB" dirty="0"/>
+              <a:t>The Design is followed by the Implementation, which should translate the design specification into </a:t>
+            </a:r>
+            <a:endParaRPr lang="de-DE" dirty="0"/>
+          </a:p>
+          <a:p>
+            <a:r>
+              <a:rPr lang="de-DE" dirty="0" err="1"/>
+              <a:t>executable</a:t>
+            </a:r>
+            <a:r>
+              <a:rPr lang="de-DE" dirty="0"/>
+              <a:t> </a:t>
+            </a:r>
+            <a:r>
+              <a:rPr lang="de-DE" dirty="0" err="1"/>
+              <a:t>program</a:t>
+            </a:r>
+            <a:r>
+              <a:rPr lang="de-DE" dirty="0"/>
+              <a:t> </a:t>
+            </a:r>
+            <a:r>
+              <a:rPr lang="de-DE" dirty="0" err="1"/>
+              <a:t>code</a:t>
+            </a:r>
+            <a:r>
+              <a:rPr lang="en-GB" dirty="0"/>
+              <a:t>. </a:t>
+            </a:r>
+          </a:p>
+          <a:p>
+            <a:r>
+              <a:rPr lang="en-GB" dirty="0"/>
+              <a:t>here are two different microcontrollers (as Mr. Hu already </a:t>
+            </a:r>
+            <a:r>
+              <a:rPr lang="en-GB" dirty="0" err="1"/>
+              <a:t>meantiond</a:t>
+            </a:r>
+            <a:r>
+              <a:rPr lang="en-GB" dirty="0"/>
+              <a:t>), so two different implementations are needed. </a:t>
+            </a:r>
+          </a:p>
+          <a:p>
+            <a:pPr marL="0" marR="0" lvl="0" indent="0" algn="l" defTabSz="914400" rtl="0" eaLnBrk="1" fontAlgn="auto" latinLnBrk="0" hangingPunct="1">
+              <a:lnSpc>
+                <a:spcPct val="100000"/>
+              </a:lnSpc>
+              <a:spcBef>
+                <a:spcPts val="0"/>
+              </a:spcBef>
+              <a:spcAft>
+                <a:spcPts val="0"/>
+              </a:spcAft>
+              <a:buClrTx/>
+              <a:buSzTx/>
+              <a:buFontTx/>
+              <a:buNone/>
+              <a:tabLst/>
+              <a:defRPr/>
+            </a:pPr>
+            <a:r>
+              <a:rPr lang="en-US" dirty="0"/>
+              <a:t>Due to the high demand for transfer speeds, SPI is chosen as the bus technology. So SPI drivers have to be implemented and tested on both sides. </a:t>
+            </a:r>
+          </a:p>
+          <a:p>
+            <a:pPr marL="0" marR="0" lvl="0" indent="0" algn="l" defTabSz="914400" rtl="0" eaLnBrk="1" fontAlgn="auto" latinLnBrk="0" hangingPunct="1">
+              <a:lnSpc>
+                <a:spcPct val="100000"/>
+              </a:lnSpc>
+              <a:spcBef>
+                <a:spcPts val="0"/>
+              </a:spcBef>
+              <a:spcAft>
+                <a:spcPts val="0"/>
+              </a:spcAft>
+              <a:buClrTx/>
+              <a:buSzTx/>
+              <a:buFontTx/>
+              <a:buNone/>
+              <a:tabLst/>
+              <a:defRPr/>
+            </a:pPr>
+            <a:endParaRPr lang="en-US" dirty="0"/>
+          </a:p>
+          <a:p>
+            <a:pPr marL="0" marR="0" lvl="0" indent="0" algn="l" defTabSz="914400" rtl="0" eaLnBrk="1" fontAlgn="auto" latinLnBrk="0" hangingPunct="1">
+              <a:lnSpc>
+                <a:spcPct val="100000"/>
+              </a:lnSpc>
+              <a:spcBef>
+                <a:spcPts val="0"/>
+              </a:spcBef>
+              <a:spcAft>
+                <a:spcPts val="0"/>
+              </a:spcAft>
+              <a:buClrTx/>
+              <a:buSzTx/>
+              <a:buFontTx/>
+              <a:buNone/>
+              <a:tabLst/>
+              <a:defRPr/>
+            </a:pPr>
+            <a:r>
+              <a:rPr lang="en-US" dirty="0"/>
+              <a:t>For an easy access of the variables, a C-struct is used.</a:t>
+            </a:r>
+          </a:p>
+          <a:p>
+            <a:pPr marL="0" marR="0" lvl="0" indent="0" algn="l" defTabSz="914400" rtl="0" eaLnBrk="1" fontAlgn="auto" latinLnBrk="0" hangingPunct="1">
+              <a:lnSpc>
+                <a:spcPct val="100000"/>
+              </a:lnSpc>
+              <a:spcBef>
+                <a:spcPts val="0"/>
+              </a:spcBef>
+              <a:spcAft>
+                <a:spcPts val="0"/>
+              </a:spcAft>
+              <a:buClrTx/>
+              <a:buSzTx/>
+              <a:buFontTx/>
+              <a:buNone/>
+              <a:tabLst/>
+              <a:defRPr/>
+            </a:pPr>
+            <a:endParaRPr lang="en-GB" dirty="0"/>
+          </a:p>
+          <a:p>
+            <a:pPr marL="0" marR="0" lvl="0" indent="0" algn="l" defTabSz="914400" rtl="0" eaLnBrk="1" fontAlgn="auto" latinLnBrk="0" hangingPunct="1">
+              <a:lnSpc>
+                <a:spcPct val="100000"/>
+              </a:lnSpc>
+              <a:spcBef>
+                <a:spcPts val="0"/>
+              </a:spcBef>
+              <a:spcAft>
+                <a:spcPts val="0"/>
+              </a:spcAft>
+              <a:buClrTx/>
+              <a:buSzTx/>
+              <a:buFontTx/>
+              <a:buNone/>
+              <a:tabLst/>
+              <a:defRPr/>
+            </a:pPr>
+            <a:r>
+              <a:rPr lang="en-GB" dirty="0"/>
+              <a:t>To test the design and implementation, at the end some benchmarks and testing sequences </a:t>
+            </a:r>
+            <a:r>
+              <a:rPr lang="en-US" dirty="0"/>
+              <a:t>have to be run through, Mr. Chen will go into more detail later.</a:t>
+            </a:r>
+          </a:p>
+          <a:p>
+            <a:pPr marL="0" marR="0" lvl="0" indent="0" algn="l" defTabSz="914400" rtl="0" eaLnBrk="1" fontAlgn="auto" latinLnBrk="0" hangingPunct="1">
+              <a:lnSpc>
+                <a:spcPct val="100000"/>
+              </a:lnSpc>
+              <a:spcBef>
+                <a:spcPts val="0"/>
+              </a:spcBef>
+              <a:spcAft>
+                <a:spcPts val="0"/>
+              </a:spcAft>
+              <a:buClrTx/>
+              <a:buSzTx/>
+              <a:buFontTx/>
+              <a:buNone/>
+              <a:tabLst/>
+              <a:defRPr/>
+            </a:pPr>
+            <a:endParaRPr lang="en-US" dirty="0"/>
+          </a:p>
+          <a:p>
+            <a:pPr marL="0" marR="0" lvl="0" indent="0" algn="l" defTabSz="914400" rtl="0" eaLnBrk="1" fontAlgn="auto" latinLnBrk="0" hangingPunct="1">
+              <a:lnSpc>
+                <a:spcPct val="100000"/>
+              </a:lnSpc>
+              <a:spcBef>
+                <a:spcPts val="0"/>
+              </a:spcBef>
+              <a:spcAft>
+                <a:spcPts val="0"/>
+              </a:spcAft>
+              <a:buClrTx/>
+              <a:buSzTx/>
+              <a:buFontTx/>
+              <a:buNone/>
+              <a:tabLst/>
+              <a:defRPr/>
+            </a:pPr>
+            <a:endParaRPr lang="en-US" dirty="0"/>
+          </a:p>
+          <a:p>
+            <a:endParaRPr lang="en-US" dirty="0"/>
+          </a:p>
+          <a:p>
+            <a:endParaRPr dirty="0"/>
           </a:p>
         </p:txBody>
       </p:sp>
@@ -10977,24 +12559,20 @@
           <a:prstGeom prst="rect">
             <a:avLst/>
           </a:prstGeom>
-          <a:ln w="28575">
-            <a:solidFill>
-              <a:srgbClr val="99C000"/>
-            </a:solidFill>
-          </a:ln>
+          <a:ln/>
         </p:spPr>
         <p:style>
-          <a:lnRef idx="2">
+          <a:lnRef idx="1">
             <a:schemeClr val="accent3"/>
           </a:lnRef>
-          <a:fillRef idx="1">
-            <a:schemeClr val="lt1"/>
+          <a:fillRef idx="3">
+            <a:schemeClr val="accent3"/>
           </a:fillRef>
-          <a:effectRef idx="0">
+          <a:effectRef idx="2">
             <a:schemeClr val="accent3"/>
           </a:effectRef>
           <a:fontRef idx="minor">
-            <a:schemeClr val="dk1"/>
+            <a:schemeClr val="lt1"/>
           </a:fontRef>
         </p:style>
         <p:txBody>
@@ -11199,7 +12777,365 @@
         <p:cTn id="1" dur="indefinite" restart="never" nodeType="tmRoot">
           <p:childTnLst>
             <p:seq>
-              <p:cTn id="2" nodeType="mainSeq"/>
+              <p:cTn id="2" nodeType="mainSeq">
+                <p:childTnLst>
+                  <p:par>
+                    <p:cTn id="3" fill="hold">
+                      <p:stCondLst>
+                        <p:cond delay="indefinite"/>
+                      </p:stCondLst>
+                      <p:childTnLst>
+                        <p:par>
+                          <p:cTn id="4" fill="hold">
+                            <p:stCondLst>
+                              <p:cond delay="0"/>
+                            </p:stCondLst>
+                            <p:childTnLst>
+                              <p:par>
+                                <p:cTn id="5" presetID="10" presetClass="entr" presetSubtype="0" fill="hold" nodeType="clickEffect">
+                                  <p:stCondLst>
+                                    <p:cond delay="0"/>
+                                  </p:stCondLst>
+                                  <p:childTnLst>
+                                    <p:set>
+                                      <p:cBhvr>
+                                        <p:cTn id="6" dur="1" fill="hold">
+                                          <p:stCondLst>
+                                            <p:cond delay="0"/>
+                                          </p:stCondLst>
+                                        </p:cTn>
+                                        <p:tgtEl>
+                                          <p:spTgt spid="4">
+                                            <p:txEl>
+                                              <p:pRg st="0" end="0"/>
+                                            </p:txEl>
+                                          </p:spTgt>
+                                        </p:tgtEl>
+                                        <p:attrNameLst>
+                                          <p:attrName>style.visibility</p:attrName>
+                                        </p:attrNameLst>
+                                      </p:cBhvr>
+                                      <p:to>
+                                        <p:strVal val="visible"/>
+                                      </p:to>
+                                    </p:set>
+                                    <p:animEffect transition="in" filter="fade">
+                                      <p:cBhvr>
+                                        <p:cTn id="7" dur="500"/>
+                                        <p:tgtEl>
+                                          <p:spTgt spid="4">
+                                            <p:txEl>
+                                              <p:pRg st="0" end="0"/>
+                                            </p:txEl>
+                                          </p:spTgt>
+                                        </p:tgtEl>
+                                      </p:cBhvr>
+                                    </p:animEffect>
+                                  </p:childTnLst>
+                                </p:cTn>
+                              </p:par>
+                              <p:par>
+                                <p:cTn id="8" presetID="10" presetClass="entr" presetSubtype="0" fill="hold" nodeType="withEffect">
+                                  <p:stCondLst>
+                                    <p:cond delay="0"/>
+                                  </p:stCondLst>
+                                  <p:childTnLst>
+                                    <p:set>
+                                      <p:cBhvr>
+                                        <p:cTn id="9" dur="1" fill="hold">
+                                          <p:stCondLst>
+                                            <p:cond delay="0"/>
+                                          </p:stCondLst>
+                                        </p:cTn>
+                                        <p:tgtEl>
+                                          <p:spTgt spid="4">
+                                            <p:txEl>
+                                              <p:pRg st="1" end="1"/>
+                                            </p:txEl>
+                                          </p:spTgt>
+                                        </p:tgtEl>
+                                        <p:attrNameLst>
+                                          <p:attrName>style.visibility</p:attrName>
+                                        </p:attrNameLst>
+                                      </p:cBhvr>
+                                      <p:to>
+                                        <p:strVal val="visible"/>
+                                      </p:to>
+                                    </p:set>
+                                    <p:animEffect transition="in" filter="fade">
+                                      <p:cBhvr>
+                                        <p:cTn id="10" dur="500"/>
+                                        <p:tgtEl>
+                                          <p:spTgt spid="4">
+                                            <p:txEl>
+                                              <p:pRg st="1" end="1"/>
+                                            </p:txEl>
+                                          </p:spTgt>
+                                        </p:tgtEl>
+                                      </p:cBhvr>
+                                    </p:animEffect>
+                                  </p:childTnLst>
+                                </p:cTn>
+                              </p:par>
+                            </p:childTnLst>
+                          </p:cTn>
+                        </p:par>
+                      </p:childTnLst>
+                    </p:cTn>
+                  </p:par>
+                  <p:par>
+                    <p:cTn id="11" fill="hold">
+                      <p:stCondLst>
+                        <p:cond delay="indefinite"/>
+                      </p:stCondLst>
+                      <p:childTnLst>
+                        <p:par>
+                          <p:cTn id="12" fill="hold">
+                            <p:stCondLst>
+                              <p:cond delay="0"/>
+                            </p:stCondLst>
+                            <p:childTnLst>
+                              <p:par>
+                                <p:cTn id="13" presetID="10" presetClass="entr" presetSubtype="0" fill="hold" nodeType="clickEffect">
+                                  <p:stCondLst>
+                                    <p:cond delay="0"/>
+                                  </p:stCondLst>
+                                  <p:childTnLst>
+                                    <p:set>
+                                      <p:cBhvr>
+                                        <p:cTn id="14" dur="1" fill="hold">
+                                          <p:stCondLst>
+                                            <p:cond delay="0"/>
+                                          </p:stCondLst>
+                                        </p:cTn>
+                                        <p:tgtEl>
+                                          <p:spTgt spid="4">
+                                            <p:txEl>
+                                              <p:pRg st="2" end="2"/>
+                                            </p:txEl>
+                                          </p:spTgt>
+                                        </p:tgtEl>
+                                        <p:attrNameLst>
+                                          <p:attrName>style.visibility</p:attrName>
+                                        </p:attrNameLst>
+                                      </p:cBhvr>
+                                      <p:to>
+                                        <p:strVal val="visible"/>
+                                      </p:to>
+                                    </p:set>
+                                    <p:animEffect transition="in" filter="fade">
+                                      <p:cBhvr>
+                                        <p:cTn id="15" dur="500"/>
+                                        <p:tgtEl>
+                                          <p:spTgt spid="4">
+                                            <p:txEl>
+                                              <p:pRg st="2" end="2"/>
+                                            </p:txEl>
+                                          </p:spTgt>
+                                        </p:tgtEl>
+                                      </p:cBhvr>
+                                    </p:animEffect>
+                                  </p:childTnLst>
+                                </p:cTn>
+                              </p:par>
+                              <p:par>
+                                <p:cTn id="16" presetID="10" presetClass="entr" presetSubtype="0" fill="hold" nodeType="withEffect">
+                                  <p:stCondLst>
+                                    <p:cond delay="0"/>
+                                  </p:stCondLst>
+                                  <p:childTnLst>
+                                    <p:set>
+                                      <p:cBhvr>
+                                        <p:cTn id="17" dur="1" fill="hold">
+                                          <p:stCondLst>
+                                            <p:cond delay="0"/>
+                                          </p:stCondLst>
+                                        </p:cTn>
+                                        <p:tgtEl>
+                                          <p:spTgt spid="4">
+                                            <p:txEl>
+                                              <p:pRg st="3" end="3"/>
+                                            </p:txEl>
+                                          </p:spTgt>
+                                        </p:tgtEl>
+                                        <p:attrNameLst>
+                                          <p:attrName>style.visibility</p:attrName>
+                                        </p:attrNameLst>
+                                      </p:cBhvr>
+                                      <p:to>
+                                        <p:strVal val="visible"/>
+                                      </p:to>
+                                    </p:set>
+                                    <p:animEffect transition="in" filter="fade">
+                                      <p:cBhvr>
+                                        <p:cTn id="18" dur="500"/>
+                                        <p:tgtEl>
+                                          <p:spTgt spid="4">
+                                            <p:txEl>
+                                              <p:pRg st="3" end="3"/>
+                                            </p:txEl>
+                                          </p:spTgt>
+                                        </p:tgtEl>
+                                      </p:cBhvr>
+                                    </p:animEffect>
+                                  </p:childTnLst>
+                                </p:cTn>
+                              </p:par>
+                              <p:par>
+                                <p:cTn id="19" presetID="10" presetClass="entr" presetSubtype="0" fill="hold" nodeType="withEffect">
+                                  <p:stCondLst>
+                                    <p:cond delay="0"/>
+                                  </p:stCondLst>
+                                  <p:childTnLst>
+                                    <p:set>
+                                      <p:cBhvr>
+                                        <p:cTn id="20" dur="1" fill="hold">
+                                          <p:stCondLst>
+                                            <p:cond delay="0"/>
+                                          </p:stCondLst>
+                                        </p:cTn>
+                                        <p:tgtEl>
+                                          <p:spTgt spid="4">
+                                            <p:txEl>
+                                              <p:pRg st="4" end="4"/>
+                                            </p:txEl>
+                                          </p:spTgt>
+                                        </p:tgtEl>
+                                        <p:attrNameLst>
+                                          <p:attrName>style.visibility</p:attrName>
+                                        </p:attrNameLst>
+                                      </p:cBhvr>
+                                      <p:to>
+                                        <p:strVal val="visible"/>
+                                      </p:to>
+                                    </p:set>
+                                    <p:animEffect transition="in" filter="fade">
+                                      <p:cBhvr>
+                                        <p:cTn id="21" dur="500"/>
+                                        <p:tgtEl>
+                                          <p:spTgt spid="4">
+                                            <p:txEl>
+                                              <p:pRg st="4" end="4"/>
+                                            </p:txEl>
+                                          </p:spTgt>
+                                        </p:tgtEl>
+                                      </p:cBhvr>
+                                    </p:animEffect>
+                                  </p:childTnLst>
+                                </p:cTn>
+                              </p:par>
+                            </p:childTnLst>
+                          </p:cTn>
+                        </p:par>
+                      </p:childTnLst>
+                    </p:cTn>
+                  </p:par>
+                  <p:par>
+                    <p:cTn id="22" fill="hold">
+                      <p:stCondLst>
+                        <p:cond delay="indefinite"/>
+                      </p:stCondLst>
+                      <p:childTnLst>
+                        <p:par>
+                          <p:cTn id="23" fill="hold">
+                            <p:stCondLst>
+                              <p:cond delay="0"/>
+                            </p:stCondLst>
+                            <p:childTnLst>
+                              <p:par>
+                                <p:cTn id="24" presetID="10" presetClass="entr" presetSubtype="0" fill="hold" nodeType="clickEffect">
+                                  <p:stCondLst>
+                                    <p:cond delay="0"/>
+                                  </p:stCondLst>
+                                  <p:childTnLst>
+                                    <p:set>
+                                      <p:cBhvr>
+                                        <p:cTn id="25" dur="1" fill="hold">
+                                          <p:stCondLst>
+                                            <p:cond delay="0"/>
+                                          </p:stCondLst>
+                                        </p:cTn>
+                                        <p:tgtEl>
+                                          <p:spTgt spid="4">
+                                            <p:txEl>
+                                              <p:pRg st="5" end="5"/>
+                                            </p:txEl>
+                                          </p:spTgt>
+                                        </p:tgtEl>
+                                        <p:attrNameLst>
+                                          <p:attrName>style.visibility</p:attrName>
+                                        </p:attrNameLst>
+                                      </p:cBhvr>
+                                      <p:to>
+                                        <p:strVal val="visible"/>
+                                      </p:to>
+                                    </p:set>
+                                    <p:animEffect transition="in" filter="fade">
+                                      <p:cBhvr>
+                                        <p:cTn id="26" dur="500"/>
+                                        <p:tgtEl>
+                                          <p:spTgt spid="4">
+                                            <p:txEl>
+                                              <p:pRg st="5" end="5"/>
+                                            </p:txEl>
+                                          </p:spTgt>
+                                        </p:tgtEl>
+                                      </p:cBhvr>
+                                    </p:animEffect>
+                                  </p:childTnLst>
+                                </p:cTn>
+                              </p:par>
+                              <p:par>
+                                <p:cTn id="27" presetID="10" presetClass="entr" presetSubtype="0" fill="hold" nodeType="withEffect">
+                                  <p:stCondLst>
+                                    <p:cond delay="0"/>
+                                  </p:stCondLst>
+                                  <p:childTnLst>
+                                    <p:set>
+                                      <p:cBhvr>
+                                        <p:cTn id="28" dur="1" fill="hold">
+                                          <p:stCondLst>
+                                            <p:cond delay="0"/>
+                                          </p:stCondLst>
+                                        </p:cTn>
+                                        <p:tgtEl>
+                                          <p:spTgt spid="4">
+                                            <p:txEl>
+                                              <p:pRg st="6" end="6"/>
+                                            </p:txEl>
+                                          </p:spTgt>
+                                        </p:tgtEl>
+                                        <p:attrNameLst>
+                                          <p:attrName>style.visibility</p:attrName>
+                                        </p:attrNameLst>
+                                      </p:cBhvr>
+                                      <p:to>
+                                        <p:strVal val="visible"/>
+                                      </p:to>
+                                    </p:set>
+                                    <p:animEffect transition="in" filter="fade">
+                                      <p:cBhvr>
+                                        <p:cTn id="29" dur="500"/>
+                                        <p:tgtEl>
+                                          <p:spTgt spid="4">
+                                            <p:txEl>
+                                              <p:pRg st="6" end="6"/>
+                                            </p:txEl>
+                                          </p:spTgt>
+                                        </p:tgtEl>
+                                      </p:cBhvr>
+                                    </p:animEffect>
+                                  </p:childTnLst>
+                                </p:cTn>
+                              </p:par>
+                            </p:childTnLst>
+                          </p:cTn>
+                        </p:par>
+                      </p:childTnLst>
+                    </p:cTn>
+                  </p:par>
+                </p:childTnLst>
+              </p:cTn>
               <p:prevCondLst>
                 <p:cond evt="onPrev" delay="0">
                   <p:tgtEl>
@@ -11303,7 +13239,7 @@
           <p:nvPr>
             <p:extLst>
               <p:ext uri="{D42A27DB-BD31-4B8C-83A1-F6EECF244321}">
-                <p14:modId xmlns:p14="http://schemas.microsoft.com/office/powerpoint/2010/main" val="1199552640"/>
+                <p14:modId xmlns:p14="http://schemas.microsoft.com/office/powerpoint/2010/main" val="1894475053"/>
               </p:ext>
             </p:extLst>
           </p:nvPr>
@@ -15633,17 +17569,17 @@
           </a:prstGeom>
         </p:spPr>
         <p:style>
-          <a:lnRef idx="2">
+          <a:lnRef idx="1">
             <a:schemeClr val="accent3"/>
           </a:lnRef>
-          <a:fillRef idx="1">
-            <a:schemeClr val="lt1"/>
+          <a:fillRef idx="3">
+            <a:schemeClr val="accent3"/>
           </a:fillRef>
-          <a:effectRef idx="0">
+          <a:effectRef idx="2">
             <a:schemeClr val="accent3"/>
           </a:effectRef>
           <a:fontRef idx="minor">
-            <a:schemeClr val="dk1"/>
+            <a:schemeClr val="lt1"/>
           </a:fontRef>
         </p:style>
         <p:txBody>
@@ -15654,7 +17590,11 @@
           <a:p>
             <a:pPr algn="r"/>
             <a:r>
-              <a:rPr lang="en-GB" dirty="0"/>
+              <a:rPr lang="en-GB" dirty="0">
+                <a:solidFill>
+                  <a:schemeClr val="tx1"/>
+                </a:solidFill>
+              </a:rPr>
               <a:t>Physical Layer</a:t>
             </a:r>
           </a:p>

</xml_diff>